<commit_message>
ir queue version 1
</commit_message>
<xml_diff>
--- a/doc/structure.pptx
+++ b/doc/structure.pptx
@@ -6254,7 +6254,7 @@
         </p:nvSpPr>
         <p:spPr>
           <a:xfrm>
-            <a:off x="164465" y="4651375"/>
+            <a:off x="164465" y="4670425"/>
             <a:ext cx="1090930" cy="706120"/>
           </a:xfrm>
           <a:prstGeom prst="flowChartPredefinedProcess">
@@ -6351,8 +6351,8 @@
         </p:nvCxnSpPr>
         <p:spPr>
           <a:xfrm>
-            <a:off x="1255395" y="5004435"/>
-            <a:ext cx="683895" cy="19050"/>
+            <a:off x="1255395" y="5023485"/>
+            <a:ext cx="683895" cy="0"/>
           </a:xfrm>
           <a:prstGeom prst="straightConnector1">
             <a:avLst/>
@@ -6379,14 +6379,14 @@
       </p:cxnSp>
       <p:sp>
         <p:nvSpPr>
-          <p:cNvPr id="20" name="文本框 19"/>
+          <p:cNvPr id="22" name="文本框 21"/>
           <p:cNvSpPr txBox="1"/>
           <p:nvPr/>
         </p:nvSpPr>
         <p:spPr>
           <a:xfrm>
-            <a:off x="1939290" y="4350385"/>
-            <a:ext cx="683260" cy="275590"/>
+            <a:off x="3213100" y="4350385"/>
+            <a:ext cx="814070" cy="275590"/>
           </a:xfrm>
           <a:prstGeom prst="rect">
             <a:avLst/>
@@ -6401,7 +6401,7 @@
             <a:pPr algn="l"/>
             <a:r>
               <a:rPr lang="en-US" altLang="zh-CN" sz="1200"/>
-              <a:t>en_load</a:t>
+              <a:t>load_addr</a:t>
             </a:r>
             <a:endParaRPr lang="en-US" altLang="zh-CN" sz="1200"/>
           </a:p>
@@ -6409,14 +6409,14 @@
       </p:sp>
       <p:sp>
         <p:nvSpPr>
-          <p:cNvPr id="22" name="文本框 21"/>
+          <p:cNvPr id="24" name="文本框 23"/>
           <p:cNvSpPr txBox="1"/>
           <p:nvPr/>
         </p:nvSpPr>
         <p:spPr>
           <a:xfrm>
-            <a:off x="2853055" y="4350385"/>
-            <a:ext cx="814070" cy="275590"/>
+            <a:off x="3561715" y="4651375"/>
+            <a:ext cx="676275" cy="275590"/>
           </a:xfrm>
           <a:prstGeom prst="rect">
             <a:avLst/>
@@ -6431,7 +6431,7 @@
             <a:pPr algn="l"/>
             <a:r>
               <a:rPr lang="en-US" altLang="zh-CN" sz="1200"/>
-              <a:t>load_addr</a:t>
+              <a:t>ir_block</a:t>
             </a:r>
             <a:endParaRPr lang="en-US" altLang="zh-CN" sz="1200"/>
           </a:p>
@@ -6439,14 +6439,14 @@
       </p:sp>
       <p:sp>
         <p:nvSpPr>
-          <p:cNvPr id="24" name="文本框 23"/>
+          <p:cNvPr id="26" name="文本框 25"/>
           <p:cNvSpPr txBox="1"/>
           <p:nvPr/>
         </p:nvSpPr>
         <p:spPr>
           <a:xfrm>
-            <a:off x="3561715" y="4651375"/>
-            <a:ext cx="676275" cy="275590"/>
+            <a:off x="2883535" y="5361305"/>
+            <a:ext cx="1354455" cy="275590"/>
           </a:xfrm>
           <a:prstGeom prst="rect">
             <a:avLst/>
@@ -6461,36 +6461,6 @@
             <a:pPr algn="l"/>
             <a:r>
               <a:rPr lang="en-US" altLang="zh-CN" sz="1200"/>
-              <a:t>ir_block</a:t>
-            </a:r>
-            <a:endParaRPr lang="en-US" altLang="zh-CN" sz="1200"/>
-          </a:p>
-        </p:txBody>
-      </p:sp>
-      <p:sp>
-        <p:nvSpPr>
-          <p:cNvPr id="26" name="文本框 25"/>
-          <p:cNvSpPr txBox="1"/>
-          <p:nvPr/>
-        </p:nvSpPr>
-        <p:spPr>
-          <a:xfrm>
-            <a:off x="2883535" y="5361305"/>
-            <a:ext cx="1354455" cy="275590"/>
-          </a:xfrm>
-          <a:prstGeom prst="rect">
-            <a:avLst/>
-          </a:prstGeom>
-          <a:noFill/>
-        </p:spPr>
-        <p:txBody>
-          <a:bodyPr wrap="none" rtlCol="0">
-            <a:spAutoFit/>
-          </a:bodyPr>
-          <a:p>
-            <a:pPr algn="l"/>
-            <a:r>
-              <a:rPr lang="en-US" altLang="zh-CN" sz="1200"/>
               <a:t>loader_data_ready</a:t>
             </a:r>
             <a:endParaRPr lang="en-US" altLang="zh-CN" sz="1200"/>
@@ -6505,7 +6475,7 @@
         </p:nvSpPr>
         <p:spPr>
           <a:xfrm>
-            <a:off x="3207385" y="1260475"/>
+            <a:off x="3213100" y="537845"/>
             <a:ext cx="2174875" cy="721360"/>
           </a:xfrm>
           <a:prstGeom prst="rect">
@@ -6725,36 +6695,6 @@
         </p:sp>
         <p:sp>
           <p:nvSpPr>
-            <p:cNvPr id="70" name="文本框 69"/>
-            <p:cNvSpPr txBox="1"/>
-            <p:nvPr/>
-          </p:nvSpPr>
-          <p:spPr>
-            <a:xfrm>
-              <a:off x="11089" y="8227"/>
-              <a:ext cx="1119" cy="715"/>
-            </a:xfrm>
-            <a:prstGeom prst="rect">
-              <a:avLst/>
-            </a:prstGeom>
-            <a:noFill/>
-          </p:spPr>
-          <p:txBody>
-            <a:bodyPr wrap="square" rtlCol="0">
-              <a:spAutoFit/>
-            </a:bodyPr>
-            <a:p>
-              <a:pPr algn="l"/>
-              <a:r>
-                <a:rPr lang="en-US" altLang="zh-CN" sz="1200"/>
-                <a:t>en_export</a:t>
-              </a:r>
-              <a:endParaRPr lang="en-US" altLang="zh-CN" sz="1200"/>
-            </a:p>
-          </p:txBody>
-        </p:sp>
-        <p:sp>
-          <p:nvSpPr>
             <p:cNvPr id="23" name="文本框 22"/>
             <p:cNvSpPr txBox="1"/>
             <p:nvPr/>
@@ -6784,41 +6724,6 @@
           </p:txBody>
         </p:sp>
       </p:grpSp>
-      <p:cxnSp>
-        <p:nvCxnSpPr>
-          <p:cNvPr id="69" name="直接箭头连接符 68"/>
-          <p:cNvCxnSpPr>
-            <a:endCxn id="4" idx="0"/>
-          </p:cNvCxnSpPr>
-          <p:nvPr/>
-        </p:nvCxnSpPr>
-        <p:spPr>
-          <a:xfrm>
-            <a:off x="6102985" y="1459865"/>
-            <a:ext cx="0" cy="896620"/>
-          </a:xfrm>
-          <a:prstGeom prst="straightConnector1">
-            <a:avLst/>
-          </a:prstGeom>
-          <a:ln>
-            <a:tailEnd type="arrow"/>
-          </a:ln>
-        </p:spPr>
-        <p:style>
-          <a:lnRef idx="1">
-            <a:schemeClr val="accent1"/>
-          </a:lnRef>
-          <a:fillRef idx="0">
-            <a:schemeClr val="accent1"/>
-          </a:fillRef>
-          <a:effectRef idx="0">
-            <a:schemeClr val="accent1"/>
-          </a:effectRef>
-          <a:fontRef idx="minor">
-            <a:schemeClr val="tx1"/>
-          </a:fontRef>
-        </p:style>
-      </p:cxnSp>
       <p:sp>
         <p:nvSpPr>
           <p:cNvPr id="4" name="矩形 3"/>
@@ -6827,7 +6732,7 @@
         </p:nvSpPr>
         <p:spPr>
           <a:xfrm>
-            <a:off x="5387975" y="2356485"/>
+            <a:off x="6586855" y="1464945"/>
             <a:ext cx="1430020" cy="368300"/>
           </a:xfrm>
           <a:prstGeom prst="rect">
@@ -6875,12 +6780,12 @@
         </p:nvCxnSpPr>
         <p:spPr>
           <a:xfrm rot="5400000">
-            <a:off x="3868738" y="2116138"/>
-            <a:ext cx="1625600" cy="2842895"/>
+            <a:off x="4202430" y="1250950"/>
+            <a:ext cx="2517140" cy="3681730"/>
           </a:xfrm>
           <a:prstGeom prst="bentConnector3">
             <a:avLst>
-              <a:gd name="adj1" fmla="val 49980"/>
+              <a:gd name="adj1" fmla="val 50000"/>
             </a:avLst>
           </a:prstGeom>
           <a:ln>
@@ -6910,8 +6815,8 @@
         </p:nvSpPr>
         <p:spPr>
           <a:xfrm>
-            <a:off x="2157730" y="2356485"/>
-            <a:ext cx="1439545" cy="504190"/>
+            <a:off x="331470" y="1464945"/>
+            <a:ext cx="2341880" cy="976630"/>
           </a:xfrm>
           <a:prstGeom prst="rect">
             <a:avLst/>
@@ -6949,18 +6854,21 @@
         <p:nvCxnSpPr>
           <p:cNvPr id="10" name="肘形连接符 9"/>
           <p:cNvCxnSpPr>
-            <a:stCxn id="25" idx="2"/>
-            <a:endCxn id="20" idx="0"/>
+            <a:stCxn id="13" idx="3"/>
+            <a:endCxn id="29" idx="0"/>
           </p:cNvCxnSpPr>
           <p:nvPr/>
         </p:nvCxnSpPr>
         <p:spPr>
-          <a:xfrm rot="10800000" flipV="1">
-            <a:off x="2280920" y="3743325"/>
-            <a:ext cx="488950" cy="607060"/>
-          </a:xfrm>
-          <a:prstGeom prst="bentConnector2">
-            <a:avLst/>
+          <a:xfrm flipH="1">
+            <a:off x="2165350" y="2257425"/>
+            <a:ext cx="508000" cy="2092960"/>
+          </a:xfrm>
+          <a:prstGeom prst="bentConnector4">
+            <a:avLst>
+              <a:gd name="adj1" fmla="val -46875"/>
+              <a:gd name="adj2" fmla="val 53307"/>
+            </a:avLst>
           </a:prstGeom>
           <a:ln>
             <a:tailEnd type="arrow"/>
@@ -6989,8 +6897,8 @@
         </p:nvSpPr>
         <p:spPr>
           <a:xfrm>
-            <a:off x="1385570" y="3712845"/>
-            <a:ext cx="741680" cy="275590"/>
+            <a:off x="2144395" y="1562735"/>
+            <a:ext cx="513080" cy="275590"/>
           </a:xfrm>
           <a:prstGeom prst="rect">
             <a:avLst/>
@@ -7004,7 +6912,7 @@
           <a:p>
             <a:r>
               <a:rPr lang="en-US" altLang="zh-CN" sz="1200"/>
-              <a:t>ir==jump</a:t>
+              <a:t>ir_hit</a:t>
             </a:r>
             <a:endParaRPr lang="en-US" altLang="zh-CN" sz="1200"/>
           </a:p>
@@ -7014,145 +6922,15 @@
         <p:nvCxnSpPr>
           <p:cNvPr id="12" name="肘形连接符 11"/>
           <p:cNvCxnSpPr>
-            <a:stCxn id="25" idx="6"/>
+            <a:stCxn id="15" idx="3"/>
             <a:endCxn id="23" idx="1"/>
           </p:cNvCxnSpPr>
           <p:nvPr/>
         </p:nvCxnSpPr>
         <p:spPr>
           <a:xfrm>
-            <a:off x="2985770" y="3743325"/>
-            <a:ext cx="4547235" cy="658495"/>
-          </a:xfrm>
-          <a:prstGeom prst="bentConnector3">
-            <a:avLst>
-              <a:gd name="adj1" fmla="val 50007"/>
-            </a:avLst>
-          </a:prstGeom>
-          <a:ln>
-            <a:tailEnd type="arrow"/>
-          </a:ln>
-        </p:spPr>
-        <p:style>
-          <a:lnRef idx="1">
-            <a:schemeClr val="accent1"/>
-          </a:lnRef>
-          <a:fillRef idx="0">
-            <a:schemeClr val="accent1"/>
-          </a:fillRef>
-          <a:effectRef idx="0">
-            <a:schemeClr val="accent1"/>
-          </a:effectRef>
-          <a:fontRef idx="minor">
-            <a:schemeClr val="tx1"/>
-          </a:fontRef>
-        </p:style>
-      </p:cxnSp>
-      <p:sp>
-        <p:nvSpPr>
-          <p:cNvPr id="14" name="文本框 13"/>
-          <p:cNvSpPr txBox="1"/>
-          <p:nvPr/>
-        </p:nvSpPr>
-        <p:spPr>
-          <a:xfrm>
-            <a:off x="4801870" y="4947920"/>
-            <a:ext cx="1622425" cy="275590"/>
-          </a:xfrm>
-          <a:prstGeom prst="rect">
-            <a:avLst/>
-          </a:prstGeom>
-          <a:noFill/>
-        </p:spPr>
-        <p:txBody>
-          <a:bodyPr wrap="none" rtlCol="0">
-            <a:spAutoFit/>
-          </a:bodyPr>
-          <a:p>
-            <a:pPr algn="l"/>
-            <a:r>
-              <a:rPr lang="en-US" altLang="zh-CN" sz="1200"/>
-              <a:t>reg_queue_data_ready</a:t>
-            </a:r>
-            <a:endParaRPr lang="en-US" altLang="zh-CN" sz="1200"/>
-          </a:p>
-        </p:txBody>
-      </p:sp>
-      <p:sp>
-        <p:nvSpPr>
-          <p:cNvPr id="15" name="文本框 14"/>
-          <p:cNvSpPr txBox="1"/>
-          <p:nvPr/>
-        </p:nvSpPr>
-        <p:spPr>
-          <a:xfrm>
-            <a:off x="6499860" y="4126230"/>
-            <a:ext cx="957580" cy="275590"/>
-          </a:xfrm>
-          <a:prstGeom prst="rect">
-            <a:avLst/>
-          </a:prstGeom>
-          <a:noFill/>
-        </p:spPr>
-        <p:txBody>
-          <a:bodyPr wrap="none" rtlCol="0">
-            <a:spAutoFit/>
-          </a:bodyPr>
-          <a:p>
-            <a:r>
-              <a:rPr lang="en-US" altLang="zh-CN" sz="1200"/>
-              <a:t>ir==set_data</a:t>
-            </a:r>
-            <a:endParaRPr lang="en-US" altLang="zh-CN" sz="1200"/>
-          </a:p>
-        </p:txBody>
-      </p:sp>
-      <p:cxnSp>
-        <p:nvCxnSpPr>
-          <p:cNvPr id="16" name="直接连接符 15"/>
-          <p:cNvCxnSpPr>
-            <a:stCxn id="9" idx="2"/>
-            <a:endCxn id="25" idx="0"/>
-          </p:cNvCxnSpPr>
-          <p:nvPr/>
-        </p:nvCxnSpPr>
-        <p:spPr>
-          <a:xfrm>
-            <a:off x="2877820" y="2860675"/>
-            <a:ext cx="0" cy="774700"/>
-          </a:xfrm>
-          <a:prstGeom prst="line">
-            <a:avLst/>
-          </a:prstGeom>
-        </p:spPr>
-        <p:style>
-          <a:lnRef idx="1">
-            <a:schemeClr val="accent1"/>
-          </a:lnRef>
-          <a:fillRef idx="0">
-            <a:schemeClr val="accent1"/>
-          </a:fillRef>
-          <a:effectRef idx="0">
-            <a:schemeClr val="accent1"/>
-          </a:effectRef>
-          <a:fontRef idx="minor">
-            <a:schemeClr val="tx1"/>
-          </a:fontRef>
-        </p:style>
-      </p:cxnSp>
-      <p:cxnSp>
-        <p:nvCxnSpPr>
-          <p:cNvPr id="17" name="肘形连接符 16"/>
-          <p:cNvCxnSpPr>
-            <a:stCxn id="14" idx="3"/>
-            <a:endCxn id="70" idx="1"/>
-          </p:cNvCxnSpPr>
-          <p:nvPr/>
-        </p:nvCxnSpPr>
-        <p:spPr>
-          <a:xfrm flipV="1">
-            <a:off x="6424295" y="5068570"/>
-            <a:ext cx="1108710" cy="17145"/>
+            <a:off x="2646045" y="1976120"/>
+            <a:ext cx="4886960" cy="2425700"/>
           </a:xfrm>
           <a:prstGeom prst="bentConnector3">
             <a:avLst>
@@ -7178,6 +6956,35 @@
           </a:fontRef>
         </p:style>
       </p:cxnSp>
+      <p:sp>
+        <p:nvSpPr>
+          <p:cNvPr id="15" name="文本框 14"/>
+          <p:cNvSpPr txBox="1"/>
+          <p:nvPr/>
+        </p:nvSpPr>
+        <p:spPr>
+          <a:xfrm>
+            <a:off x="1929130" y="1838325"/>
+            <a:ext cx="716915" cy="275590"/>
+          </a:xfrm>
+          <a:prstGeom prst="rect">
+            <a:avLst/>
+          </a:prstGeom>
+          <a:noFill/>
+        </p:spPr>
+        <p:txBody>
+          <a:bodyPr wrap="none" rtlCol="0">
+            <a:spAutoFit/>
+          </a:bodyPr>
+          <a:p>
+            <a:r>
+              <a:rPr lang="en-US" altLang="zh-CN" sz="1200"/>
+              <a:t>set_data</a:t>
+            </a:r>
+            <a:endParaRPr lang="en-US" altLang="zh-CN" sz="1200"/>
+          </a:p>
+        </p:txBody>
+      </p:sp>
       <p:cxnSp>
         <p:nvCxnSpPr>
           <p:cNvPr id="18" name="肘形连接符 17"/>
@@ -7262,7 +7069,7 @@
         </p:nvSpPr>
         <p:spPr>
           <a:xfrm>
-            <a:off x="2769870" y="3635375"/>
+            <a:off x="7193915" y="537845"/>
             <a:ext cx="215900" cy="215900"/>
           </a:xfrm>
           <a:prstGeom prst="ellipse">
@@ -7302,6 +7109,170 @@
           </a:p>
         </p:txBody>
       </p:sp>
+      <p:sp>
+        <p:nvSpPr>
+          <p:cNvPr id="13" name="文本框 12"/>
+          <p:cNvSpPr txBox="1"/>
+          <p:nvPr/>
+        </p:nvSpPr>
+        <p:spPr>
+          <a:xfrm>
+            <a:off x="1420495" y="2119630"/>
+            <a:ext cx="1252855" cy="275590"/>
+          </a:xfrm>
+          <a:prstGeom prst="rect">
+            <a:avLst/>
+          </a:prstGeom>
+          <a:noFill/>
+        </p:spPr>
+        <p:txBody>
+          <a:bodyPr wrap="none" rtlCol="0">
+            <a:spAutoFit/>
+          </a:bodyPr>
+          <a:p>
+            <a:r>
+              <a:rPr lang="en-US" altLang="zh-CN" sz="1200"/>
+              <a:t>load_ir_block_en</a:t>
+            </a:r>
+            <a:endParaRPr lang="en-US" altLang="zh-CN" sz="1200"/>
+          </a:p>
+        </p:txBody>
+      </p:sp>
+      <p:cxnSp>
+        <p:nvCxnSpPr>
+          <p:cNvPr id="21" name="肘形连接符 20"/>
+          <p:cNvCxnSpPr>
+            <a:stCxn id="11" idx="3"/>
+            <a:endCxn id="4" idx="1"/>
+          </p:cNvCxnSpPr>
+          <p:nvPr/>
+        </p:nvCxnSpPr>
+        <p:spPr>
+          <a:xfrm flipV="1">
+            <a:off x="2657475" y="1649095"/>
+            <a:ext cx="3929380" cy="51435"/>
+          </a:xfrm>
+          <a:prstGeom prst="bentConnector3">
+            <a:avLst>
+              <a:gd name="adj1" fmla="val 50000"/>
+            </a:avLst>
+          </a:prstGeom>
+          <a:ln>
+            <a:tailEnd type="arrow"/>
+          </a:ln>
+        </p:spPr>
+        <p:style>
+          <a:lnRef idx="1">
+            <a:schemeClr val="accent1"/>
+          </a:lnRef>
+          <a:fillRef idx="0">
+            <a:schemeClr val="accent1"/>
+          </a:fillRef>
+          <a:effectRef idx="0">
+            <a:schemeClr val="accent1"/>
+          </a:effectRef>
+          <a:fontRef idx="minor">
+            <a:schemeClr val="tx1"/>
+          </a:fontRef>
+        </p:style>
+      </p:cxnSp>
+      <p:sp>
+        <p:nvSpPr>
+          <p:cNvPr id="29" name="文本框 28"/>
+          <p:cNvSpPr txBox="1"/>
+          <p:nvPr/>
+        </p:nvSpPr>
+        <p:spPr>
+          <a:xfrm>
+            <a:off x="1939290" y="4350385"/>
+            <a:ext cx="451485" cy="275590"/>
+          </a:xfrm>
+          <a:prstGeom prst="rect">
+            <a:avLst/>
+          </a:prstGeom>
+          <a:noFill/>
+        </p:spPr>
+        <p:txBody>
+          <a:bodyPr wrap="none" rtlCol="0">
+            <a:spAutoFit/>
+          </a:bodyPr>
+          <a:p>
+            <a:r>
+              <a:rPr lang="en-US" altLang="zh-CN" sz="1200"/>
+              <a:t>load</a:t>
+            </a:r>
+            <a:endParaRPr lang="en-US" altLang="zh-CN" sz="1200"/>
+          </a:p>
+        </p:txBody>
+      </p:sp>
+      <p:sp>
+        <p:nvSpPr>
+          <p:cNvPr id="30" name="文本框 29"/>
+          <p:cNvSpPr txBox="1"/>
+          <p:nvPr/>
+        </p:nvSpPr>
+        <p:spPr>
+          <a:xfrm>
+            <a:off x="2320925" y="4350385"/>
+            <a:ext cx="892175" cy="275590"/>
+          </a:xfrm>
+          <a:prstGeom prst="rect">
+            <a:avLst/>
+          </a:prstGeom>
+          <a:noFill/>
+        </p:spPr>
+        <p:txBody>
+          <a:bodyPr wrap="none" rtlCol="0">
+            <a:spAutoFit/>
+          </a:bodyPr>
+          <a:p>
+            <a:pPr algn="l"/>
+            <a:r>
+              <a:rPr lang="en-US" altLang="zh-CN" sz="1200">
+                <a:sym typeface="+mn-ea"/>
+              </a:rPr>
+              <a:t> next_block</a:t>
+            </a:r>
+            <a:endParaRPr lang="en-US" altLang="zh-CN" sz="1200"/>
+          </a:p>
+        </p:txBody>
+      </p:sp>
+      <p:cxnSp>
+        <p:nvCxnSpPr>
+          <p:cNvPr id="16" name="肘形连接符 15"/>
+          <p:cNvCxnSpPr>
+            <a:stCxn id="13" idx="3"/>
+            <a:endCxn id="7" idx="0"/>
+          </p:cNvCxnSpPr>
+          <p:nvPr/>
+        </p:nvCxnSpPr>
+        <p:spPr>
+          <a:xfrm>
+            <a:off x="2673350" y="2257425"/>
+            <a:ext cx="3030855" cy="2245995"/>
+          </a:xfrm>
+          <a:prstGeom prst="bentConnector2">
+            <a:avLst/>
+          </a:prstGeom>
+          <a:ln>
+            <a:tailEnd type="arrow"/>
+          </a:ln>
+        </p:spPr>
+        <p:style>
+          <a:lnRef idx="1">
+            <a:schemeClr val="accent1"/>
+          </a:lnRef>
+          <a:fillRef idx="0">
+            <a:schemeClr val="accent1"/>
+          </a:fillRef>
+          <a:effectRef idx="0">
+            <a:schemeClr val="accent1"/>
+          </a:effectRef>
+          <a:fontRef idx="minor">
+            <a:schemeClr val="tx1"/>
+          </a:fontRef>
+        </p:style>
+      </p:cxnSp>
     </p:spTree>
   </p:cSld>
   <p:clrMapOvr>

</xml_diff>